<commit_message>
C Sharp Static  Keyword
C Sharp Static  Keyword
</commit_message>
<xml_diff>
--- a/PPTs/C Sharp - Abstract Class.pptx
+++ b/PPTs/C Sharp - Abstract Class.pptx
@@ -5515,13 +5515,13 @@
             </a:br>
             <a:r>
               <a:rPr lang="en-US" sz="2400" b="1" dirty="0" smtClean="0">
-                <a:hlinkClick r:id="rId2"/>
+                <a:hlinkClick r:id="rId3"/>
               </a:rPr>
               <a:t>Visit CourseIng for Online Training, Corporate Training and Class Room trainings.</a:t>
             </a:r>
             <a:br>
               <a:rPr lang="en-US" sz="2400" b="1" dirty="0" smtClean="0">
-                <a:hlinkClick r:id="rId2"/>
+                <a:hlinkClick r:id="rId3"/>
               </a:rPr>
             </a:br>
             <a:endParaRPr lang="en-US" sz="2800" b="1" dirty="0"/>
@@ -5559,7 +5559,7 @@
                     <a:lumOff val="5000"/>
                   </a:schemeClr>
                 </a:solidFill>
-                <a:hlinkClick r:id="rId2"/>
+                <a:hlinkClick r:id="rId3"/>
               </a:rPr>
               <a:t>http://www.courseing.com</a:t>
             </a:r>

</xml_diff>